<commit_message>
Korrektur von dauerindays, relende, relstart ...
</commit_message>
<xml_diff>
--- a/Projectboard/Projectboard/bin/Debug/requirements/projektdossier.pptx
+++ b/Projectboard/Projectboard/bin/Debug/requirements/projektdossier.pptx
@@ -11,7 +11,7 @@
     <p:sldId id="268" r:id="rId2"/>
   </p:sldIdLst>
   <p:sldSz cx="13004800" cy="9753600"/>
-  <p:notesSz cx="6864350" cy="9996488"/>
+  <p:notesSz cx="6858000" cy="9144000"/>
   <p:defaultTextStyle>
     <a:defPPr>
       <a:defRPr lang="de-DE"/>
@@ -186,8 +186,8 @@
         </p:nvSpPr>
         <p:spPr bwMode="auto">
           <a:xfrm>
-            <a:off x="933450" y="749300"/>
-            <a:ext cx="4997450" cy="3749675"/>
+            <a:off x="1143000" y="685800"/>
+            <a:ext cx="4572000" cy="3429000"/>
           </a:xfrm>
           <a:prstGeom prst="rect">
             <a:avLst/>
@@ -240,8 +240,8 @@
         </p:nvSpPr>
         <p:spPr bwMode="auto">
           <a:xfrm>
-            <a:off x="915247" y="4748332"/>
-            <a:ext cx="5033857" cy="4498420"/>
+            <a:off x="914400" y="4343400"/>
+            <a:ext cx="5029200" cy="4114800"/>
           </a:xfrm>
           <a:prstGeom prst="rect">
             <a:avLst/>
@@ -282,7 +282,7 @@
           </a:extLst>
         </p:spPr>
         <p:txBody>
-          <a:bodyPr vert="horz" wrap="square" lIns="96341" tIns="48171" rIns="96341" bIns="48171" numCol="1" anchor="t" anchorCtr="0" compatLnSpc="1">
+          <a:bodyPr vert="horz" wrap="square" lIns="91440" tIns="45720" rIns="91440" bIns="45720" numCol="1" anchor="t" anchorCtr="0" compatLnSpc="1">
             <a:prstTxWarp prst="textNoShape">
               <a:avLst/>
             </a:prstTxWarp>

</xml_diff>